<commit_message>
Improved documentation of ArrayPanel.
</commit_message>
<xml_diff>
--- a/docs/Diagrams.pptx
+++ b/docs/Diagrams.pptx
@@ -6,6 +6,7 @@
   </p:sldMasterIdLst>
   <p:sldIdLst>
     <p:sldId id="256" r:id="rId2"/>
+    <p:sldId id="257" r:id="rId3"/>
   </p:sldIdLst>
   <p:sldSz cx="12192000" cy="6858000"/>
   <p:notesSz cx="6858000" cy="9144000"/>
@@ -104,6 +105,11 @@
       </a:defRPr>
     </a:lvl9pPr>
   </p:defaultTextStyle>
+  <p:extLst>
+    <p:ext uri="{EFAFB233-063F-42B5-8137-9DF3F51BA10A}">
+      <p15:sldGuideLst xmlns:p15="http://schemas.microsoft.com/office/powerpoint/2012/main"/>
+    </p:ext>
+  </p:extLst>
 </p:presentation>
 </file>
 
@@ -254,7 +260,7 @@
           <a:p>
             <a:fld id="{48B01F8D-4597-446C-ADBC-999FE2156746}" type="datetimeFigureOut">
               <a:rPr lang="en-US" smtClean="0"/>
-              <a:t>3/11/2019</a:t>
+              <a:t>3/20/2019</a:t>
             </a:fld>
             <a:endParaRPr lang="en-US"/>
           </a:p>
@@ -452,7 +458,7 @@
           <a:p>
             <a:fld id="{48B01F8D-4597-446C-ADBC-999FE2156746}" type="datetimeFigureOut">
               <a:rPr lang="en-US" smtClean="0"/>
-              <a:t>3/11/2019</a:t>
+              <a:t>3/20/2019</a:t>
             </a:fld>
             <a:endParaRPr lang="en-US"/>
           </a:p>
@@ -660,7 +666,7 @@
           <a:p>
             <a:fld id="{48B01F8D-4597-446C-ADBC-999FE2156746}" type="datetimeFigureOut">
               <a:rPr lang="en-US" smtClean="0"/>
-              <a:t>3/11/2019</a:t>
+              <a:t>3/20/2019</a:t>
             </a:fld>
             <a:endParaRPr lang="en-US"/>
           </a:p>
@@ -858,7 +864,7 @@
           <a:p>
             <a:fld id="{48B01F8D-4597-446C-ADBC-999FE2156746}" type="datetimeFigureOut">
               <a:rPr lang="en-US" smtClean="0"/>
-              <a:t>3/11/2019</a:t>
+              <a:t>3/20/2019</a:t>
             </a:fld>
             <a:endParaRPr lang="en-US"/>
           </a:p>
@@ -1133,7 +1139,7 @@
           <a:p>
             <a:fld id="{48B01F8D-4597-446C-ADBC-999FE2156746}" type="datetimeFigureOut">
               <a:rPr lang="en-US" smtClean="0"/>
-              <a:t>3/11/2019</a:t>
+              <a:t>3/20/2019</a:t>
             </a:fld>
             <a:endParaRPr lang="en-US"/>
           </a:p>
@@ -1398,7 +1404,7 @@
           <a:p>
             <a:fld id="{48B01F8D-4597-446C-ADBC-999FE2156746}" type="datetimeFigureOut">
               <a:rPr lang="en-US" smtClean="0"/>
-              <a:t>3/11/2019</a:t>
+              <a:t>3/20/2019</a:t>
             </a:fld>
             <a:endParaRPr lang="en-US"/>
           </a:p>
@@ -1810,7 +1816,7 @@
           <a:p>
             <a:fld id="{48B01F8D-4597-446C-ADBC-999FE2156746}" type="datetimeFigureOut">
               <a:rPr lang="en-US" smtClean="0"/>
-              <a:t>3/11/2019</a:t>
+              <a:t>3/20/2019</a:t>
             </a:fld>
             <a:endParaRPr lang="en-US"/>
           </a:p>
@@ -1951,7 +1957,7 @@
           <a:p>
             <a:fld id="{48B01F8D-4597-446C-ADBC-999FE2156746}" type="datetimeFigureOut">
               <a:rPr lang="en-US" smtClean="0"/>
-              <a:t>3/11/2019</a:t>
+              <a:t>3/20/2019</a:t>
             </a:fld>
             <a:endParaRPr lang="en-US"/>
           </a:p>
@@ -2064,7 +2070,7 @@
           <a:p>
             <a:fld id="{48B01F8D-4597-446C-ADBC-999FE2156746}" type="datetimeFigureOut">
               <a:rPr lang="en-US" smtClean="0"/>
-              <a:t>3/11/2019</a:t>
+              <a:t>3/20/2019</a:t>
             </a:fld>
             <a:endParaRPr lang="en-US"/>
           </a:p>
@@ -2375,7 +2381,7 @@
           <a:p>
             <a:fld id="{48B01F8D-4597-446C-ADBC-999FE2156746}" type="datetimeFigureOut">
               <a:rPr lang="en-US" smtClean="0"/>
-              <a:t>3/11/2019</a:t>
+              <a:t>3/20/2019</a:t>
             </a:fld>
             <a:endParaRPr lang="en-US"/>
           </a:p>
@@ -2663,7 +2669,7 @@
           <a:p>
             <a:fld id="{48B01F8D-4597-446C-ADBC-999FE2156746}" type="datetimeFigureOut">
               <a:rPr lang="en-US" smtClean="0"/>
-              <a:t>3/11/2019</a:t>
+              <a:t>3/20/2019</a:t>
             </a:fld>
             <a:endParaRPr lang="en-US"/>
           </a:p>
@@ -2904,7 +2910,7 @@
           <a:p>
             <a:fld id="{48B01F8D-4597-446C-ADBC-999FE2156746}" type="datetimeFigureOut">
               <a:rPr lang="en-US" smtClean="0"/>
-              <a:t>3/11/2019</a:t>
+              <a:t>3/20/2019</a:t>
             </a:fld>
             <a:endParaRPr lang="en-US"/>
           </a:p>
@@ -3335,8 +3341,8 @@
         </p:nvSpPr>
         <p:spPr>
           <a:xfrm>
-            <a:off x="2483708" y="2100648"/>
-            <a:ext cx="3107724" cy="1080000"/>
+            <a:off x="2555706" y="2172648"/>
+            <a:ext cx="2951999" cy="936000"/>
           </a:xfrm>
           <a:prstGeom prst="rect">
             <a:avLst/>
@@ -3541,13 +3547,15 @@
               </a:ext>
             </a:extLst>
           </p:cNvPr>
-          <p:cNvCxnSpPr/>
+          <p:cNvCxnSpPr>
+            <a:cxnSpLocks/>
+          </p:cNvCxnSpPr>
           <p:nvPr/>
         </p:nvCxnSpPr>
         <p:spPr>
           <a:xfrm>
-            <a:off x="2483708" y="3429000"/>
-            <a:ext cx="3107724" cy="0"/>
+            <a:off x="2555706" y="3429000"/>
+            <a:ext cx="2951999" cy="0"/>
           </a:xfrm>
           <a:prstGeom prst="straightConnector1">
             <a:avLst/>
@@ -3585,8 +3593,8 @@
         </p:nvSpPr>
         <p:spPr>
           <a:xfrm rot="16200000">
-            <a:off x="3899070" y="-78785"/>
-            <a:ext cx="276999" cy="3107723"/>
+            <a:off x="3893206" y="-925"/>
+            <a:ext cx="276999" cy="2951999"/>
           </a:xfrm>
           <a:prstGeom prst="rightBrace">
             <a:avLst>
@@ -3679,7 +3687,7 @@
         </p:nvSpPr>
         <p:spPr>
           <a:xfrm>
-            <a:off x="4906683" y="1697505"/>
+            <a:off x="4351728" y="1735473"/>
             <a:ext cx="1375954" cy="276999"/>
           </a:xfrm>
           <a:prstGeom prst="rect">
@@ -3738,8 +3746,8 @@
         </p:nvCxnSpPr>
         <p:spPr>
           <a:xfrm flipH="1">
-            <a:off x="4571705" y="1974504"/>
-            <a:ext cx="1022955" cy="666144"/>
+            <a:off x="4571705" y="2012472"/>
+            <a:ext cx="468000" cy="628176"/>
           </a:xfrm>
           <a:prstGeom prst="straightConnector1">
             <a:avLst/>
@@ -3781,8 +3789,8 @@
         </p:nvCxnSpPr>
         <p:spPr>
           <a:xfrm flipH="1">
-            <a:off x="3563706" y="1974504"/>
-            <a:ext cx="2030954" cy="666144"/>
+            <a:off x="3563706" y="2012472"/>
+            <a:ext cx="1475999" cy="628176"/>
           </a:xfrm>
           <a:prstGeom prst="straightConnector1">
             <a:avLst/>
@@ -3808,10 +3816,10 @@
       </p:cxnSp>
       <p:sp>
         <p:nvSpPr>
-          <p:cNvPr id="21" name="TextBox 20">
-            <a:extLst>
-              <a:ext uri="{FF2B5EF4-FFF2-40B4-BE49-F238E27FC236}">
-                <a16:creationId xmlns:a16="http://schemas.microsoft.com/office/drawing/2014/main" id="{1F96AD62-920F-4A51-9552-06EC75700E9F}"/>
+          <p:cNvPr id="38" name="TextBox 37">
+            <a:extLst>
+              <a:ext uri="{FF2B5EF4-FFF2-40B4-BE49-F238E27FC236}">
+                <a16:creationId xmlns:a16="http://schemas.microsoft.com/office/drawing/2014/main" id="{830B4EBC-AA88-46F7-856C-70262F9A25C1}"/>
               </a:ext>
             </a:extLst>
           </p:cNvPr>
@@ -3820,368 +3828,7 @@
         </p:nvSpPr>
         <p:spPr>
           <a:xfrm>
-            <a:off x="567374" y="1697505"/>
-            <a:ext cx="1396665" cy="276999"/>
-          </a:xfrm>
-          <a:prstGeom prst="rect">
-            <a:avLst/>
-          </a:prstGeom>
-          <a:noFill/>
-        </p:spPr>
-        <p:txBody>
-          <a:bodyPr wrap="none" rtlCol="0">
-            <a:spAutoFit/>
-          </a:bodyPr>
-          <a:lstStyle>
-            <a:defPPr>
-              <a:defRPr lang="en-US"/>
-            </a:defPPr>
-            <a:lvl1pPr algn="ctr">
-              <a:defRPr sz="1200">
-                <a:solidFill>
-                  <a:schemeClr val="accent5"/>
-                </a:solidFill>
-              </a:defRPr>
-            </a:lvl1pPr>
-          </a:lstStyle>
-          <a:p>
-            <a:r>
-              <a:rPr lang="en-US" err="1">
-                <a:solidFill>
-                  <a:schemeClr val="accent6"/>
-                </a:solidFill>
-              </a:rPr>
-              <a:t>ArrayPanel.Padding</a:t>
-            </a:r>
-            <a:endParaRPr lang="en-US">
-              <a:solidFill>
-                <a:schemeClr val="accent6"/>
-              </a:solidFill>
-            </a:endParaRPr>
-          </a:p>
-        </p:txBody>
-      </p:sp>
-      <p:cxnSp>
-        <p:nvCxnSpPr>
-          <p:cNvPr id="22" name="Straight Arrow Connector 21">
-            <a:extLst>
-              <a:ext uri="{FF2B5EF4-FFF2-40B4-BE49-F238E27FC236}">
-                <a16:creationId xmlns:a16="http://schemas.microsoft.com/office/drawing/2014/main" id="{F3AB5668-4181-4522-8F5B-0D33131F801C}"/>
-              </a:ext>
-            </a:extLst>
-          </p:cNvPr>
-          <p:cNvCxnSpPr>
-            <a:cxnSpLocks/>
-            <a:stCxn id="21" idx="3"/>
-            <a:endCxn id="31" idx="1"/>
-          </p:cNvCxnSpPr>
-          <p:nvPr/>
-        </p:nvCxnSpPr>
-        <p:spPr>
-          <a:xfrm>
-            <a:off x="1964039" y="1836005"/>
-            <a:ext cx="519595" cy="804642"/>
-          </a:xfrm>
-          <a:prstGeom prst="straightConnector1">
-            <a:avLst/>
-          </a:prstGeom>
-          <a:ln w="12700">
-            <a:solidFill>
-              <a:schemeClr val="accent6">
-                <a:lumMod val="40000"/>
-                <a:lumOff val="60000"/>
-              </a:schemeClr>
-            </a:solidFill>
-            <a:tailEnd type="triangle"/>
-          </a:ln>
-        </p:spPr>
-        <p:style>
-          <a:lnRef idx="1">
-            <a:schemeClr val="accent6"/>
-          </a:lnRef>
-          <a:fillRef idx="0">
-            <a:schemeClr val="accent6"/>
-          </a:fillRef>
-          <a:effectRef idx="0">
-            <a:schemeClr val="accent6"/>
-          </a:effectRef>
-          <a:fontRef idx="minor">
-            <a:schemeClr val="tx1"/>
-          </a:fontRef>
-        </p:style>
-      </p:cxnSp>
-      <p:sp>
-        <p:nvSpPr>
-          <p:cNvPr id="25" name="Rectangle 24">
-            <a:extLst>
-              <a:ext uri="{FF2B5EF4-FFF2-40B4-BE49-F238E27FC236}">
-                <a16:creationId xmlns:a16="http://schemas.microsoft.com/office/drawing/2014/main" id="{7DB920FC-D6B6-4099-9726-927B422B6A64}"/>
-              </a:ext>
-            </a:extLst>
-          </p:cNvPr>
-          <p:cNvSpPr/>
-          <p:nvPr/>
-        </p:nvSpPr>
-        <p:spPr>
-          <a:xfrm>
-            <a:off x="4499706" y="2460648"/>
-            <a:ext cx="71999" cy="360000"/>
-          </a:xfrm>
-          <a:prstGeom prst="rect">
-            <a:avLst/>
-          </a:prstGeom>
-          <a:ln>
-            <a:noFill/>
-          </a:ln>
-        </p:spPr>
-        <p:style>
-          <a:lnRef idx="2">
-            <a:schemeClr val="accent2">
-              <a:shade val="50000"/>
-            </a:schemeClr>
-          </a:lnRef>
-          <a:fillRef idx="1">
-            <a:schemeClr val="accent2"/>
-          </a:fillRef>
-          <a:effectRef idx="0">
-            <a:schemeClr val="accent2"/>
-          </a:effectRef>
-          <a:fontRef idx="minor">
-            <a:schemeClr val="lt1"/>
-          </a:fontRef>
-        </p:style>
-        <p:txBody>
-          <a:bodyPr rtlCol="0" anchor="ctr"/>
-          <a:lstStyle/>
-          <a:p>
-            <a:pPr algn="ctr"/>
-            <a:endParaRPr lang="en-US"/>
-          </a:p>
-        </p:txBody>
-      </p:sp>
-      <p:sp>
-        <p:nvSpPr>
-          <p:cNvPr id="26" name="Rectangle 25">
-            <a:extLst>
-              <a:ext uri="{FF2B5EF4-FFF2-40B4-BE49-F238E27FC236}">
-                <a16:creationId xmlns:a16="http://schemas.microsoft.com/office/drawing/2014/main" id="{4511561F-3BE7-4CCD-859D-3D5A62BB31BF}"/>
-              </a:ext>
-            </a:extLst>
-          </p:cNvPr>
-          <p:cNvSpPr/>
-          <p:nvPr/>
-        </p:nvSpPr>
-        <p:spPr>
-          <a:xfrm>
-            <a:off x="3491559" y="2460647"/>
-            <a:ext cx="71999" cy="360000"/>
-          </a:xfrm>
-          <a:prstGeom prst="rect">
-            <a:avLst/>
-          </a:prstGeom>
-          <a:ln>
-            <a:noFill/>
-          </a:ln>
-        </p:spPr>
-        <p:style>
-          <a:lnRef idx="2">
-            <a:schemeClr val="accent2">
-              <a:shade val="50000"/>
-            </a:schemeClr>
-          </a:lnRef>
-          <a:fillRef idx="1">
-            <a:schemeClr val="accent2"/>
-          </a:fillRef>
-          <a:effectRef idx="0">
-            <a:schemeClr val="accent2"/>
-          </a:effectRef>
-          <a:fontRef idx="minor">
-            <a:schemeClr val="lt1"/>
-          </a:fontRef>
-        </p:style>
-        <p:txBody>
-          <a:bodyPr rtlCol="0" anchor="ctr"/>
-          <a:lstStyle/>
-          <a:p>
-            <a:pPr algn="ctr"/>
-            <a:endParaRPr lang="en-US"/>
-          </a:p>
-        </p:txBody>
-      </p:sp>
-      <p:sp>
-        <p:nvSpPr>
-          <p:cNvPr id="31" name="Rectangle 30">
-            <a:extLst>
-              <a:ext uri="{FF2B5EF4-FFF2-40B4-BE49-F238E27FC236}">
-                <a16:creationId xmlns:a16="http://schemas.microsoft.com/office/drawing/2014/main" id="{6E4D8CFC-854E-4C23-9072-893D471E52E9}"/>
-              </a:ext>
-            </a:extLst>
-          </p:cNvPr>
-          <p:cNvSpPr/>
-          <p:nvPr/>
-        </p:nvSpPr>
-        <p:spPr>
-          <a:xfrm>
-            <a:off x="2483634" y="2460647"/>
-            <a:ext cx="71999" cy="360000"/>
-          </a:xfrm>
-          <a:prstGeom prst="rect">
-            <a:avLst/>
-          </a:prstGeom>
-          <a:solidFill>
-            <a:schemeClr val="accent6">
-              <a:lumMod val="60000"/>
-              <a:lumOff val="40000"/>
-            </a:schemeClr>
-          </a:solidFill>
-          <a:ln>
-            <a:noFill/>
-          </a:ln>
-        </p:spPr>
-        <p:style>
-          <a:lnRef idx="2">
-            <a:schemeClr val="accent2">
-              <a:shade val="50000"/>
-            </a:schemeClr>
-          </a:lnRef>
-          <a:fillRef idx="1">
-            <a:schemeClr val="accent2"/>
-          </a:fillRef>
-          <a:effectRef idx="0">
-            <a:schemeClr val="accent2"/>
-          </a:effectRef>
-          <a:fontRef idx="minor">
-            <a:schemeClr val="lt1"/>
-          </a:fontRef>
-        </p:style>
-        <p:txBody>
-          <a:bodyPr rtlCol="0" anchor="ctr"/>
-          <a:lstStyle/>
-          <a:p>
-            <a:pPr algn="ctr"/>
-            <a:endParaRPr lang="en-US"/>
-          </a:p>
-        </p:txBody>
-      </p:sp>
-      <p:sp>
-        <p:nvSpPr>
-          <p:cNvPr id="32" name="Rectangle 31">
-            <a:extLst>
-              <a:ext uri="{FF2B5EF4-FFF2-40B4-BE49-F238E27FC236}">
-                <a16:creationId xmlns:a16="http://schemas.microsoft.com/office/drawing/2014/main" id="{C0269DF1-7E8D-488A-9CC4-CD795460AB92}"/>
-              </a:ext>
-            </a:extLst>
-          </p:cNvPr>
-          <p:cNvSpPr/>
-          <p:nvPr/>
-        </p:nvSpPr>
-        <p:spPr>
-          <a:xfrm rot="5400000">
-            <a:off x="2987707" y="1956649"/>
-            <a:ext cx="71999" cy="360000"/>
-          </a:xfrm>
-          <a:prstGeom prst="rect">
-            <a:avLst/>
-          </a:prstGeom>
-          <a:solidFill>
-            <a:schemeClr val="accent6">
-              <a:lumMod val="60000"/>
-              <a:lumOff val="40000"/>
-            </a:schemeClr>
-          </a:solidFill>
-          <a:ln>
-            <a:noFill/>
-          </a:ln>
-        </p:spPr>
-        <p:style>
-          <a:lnRef idx="2">
-            <a:schemeClr val="accent2">
-              <a:shade val="50000"/>
-            </a:schemeClr>
-          </a:lnRef>
-          <a:fillRef idx="1">
-            <a:schemeClr val="accent2"/>
-          </a:fillRef>
-          <a:effectRef idx="0">
-            <a:schemeClr val="accent2"/>
-          </a:effectRef>
-          <a:fontRef idx="minor">
-            <a:schemeClr val="lt1"/>
-          </a:fontRef>
-        </p:style>
-        <p:txBody>
-          <a:bodyPr rtlCol="0" anchor="ctr"/>
-          <a:lstStyle/>
-          <a:p>
-            <a:pPr algn="ctr"/>
-            <a:endParaRPr lang="en-US"/>
-          </a:p>
-        </p:txBody>
-      </p:sp>
-      <p:cxnSp>
-        <p:nvCxnSpPr>
-          <p:cNvPr id="35" name="Straight Arrow Connector 34">
-            <a:extLst>
-              <a:ext uri="{FF2B5EF4-FFF2-40B4-BE49-F238E27FC236}">
-                <a16:creationId xmlns:a16="http://schemas.microsoft.com/office/drawing/2014/main" id="{2A114B21-C997-4D5B-952A-242B5B03AA82}"/>
-              </a:ext>
-            </a:extLst>
-          </p:cNvPr>
-          <p:cNvCxnSpPr>
-            <a:cxnSpLocks/>
-            <a:stCxn id="21" idx="3"/>
-            <a:endCxn id="32" idx="2"/>
-          </p:cNvCxnSpPr>
-          <p:nvPr/>
-        </p:nvCxnSpPr>
-        <p:spPr>
-          <a:xfrm>
-            <a:off x="1964039" y="1836005"/>
-            <a:ext cx="879668" cy="300645"/>
-          </a:xfrm>
-          <a:prstGeom prst="straightConnector1">
-            <a:avLst/>
-          </a:prstGeom>
-          <a:ln w="12700">
-            <a:solidFill>
-              <a:schemeClr val="accent6">
-                <a:lumMod val="40000"/>
-                <a:lumOff val="60000"/>
-              </a:schemeClr>
-            </a:solidFill>
-            <a:tailEnd type="triangle"/>
-          </a:ln>
-        </p:spPr>
-        <p:style>
-          <a:lnRef idx="1">
-            <a:schemeClr val="accent6"/>
-          </a:lnRef>
-          <a:fillRef idx="0">
-            <a:schemeClr val="accent6"/>
-          </a:fillRef>
-          <a:effectRef idx="0">
-            <a:schemeClr val="accent6"/>
-          </a:effectRef>
-          <a:fontRef idx="minor">
-            <a:schemeClr val="tx1"/>
-          </a:fontRef>
-        </p:style>
-      </p:cxnSp>
-      <p:sp>
-        <p:nvSpPr>
-          <p:cNvPr id="38" name="TextBox 37">
-            <a:extLst>
-              <a:ext uri="{FF2B5EF4-FFF2-40B4-BE49-F238E27FC236}">
-                <a16:creationId xmlns:a16="http://schemas.microsoft.com/office/drawing/2014/main" id="{830B4EBC-AA88-46F7-856C-70262F9A25C1}"/>
-              </a:ext>
-            </a:extLst>
-          </p:cNvPr>
-          <p:cNvSpPr txBox="1"/>
-          <p:nvPr/>
-        </p:nvSpPr>
-        <p:spPr>
-          <a:xfrm>
-            <a:off x="3952524" y="3890209"/>
+            <a:off x="2725252" y="3890209"/>
             <a:ext cx="2049151" cy="461665"/>
           </a:xfrm>
           <a:prstGeom prst="rect">
@@ -4240,7 +3887,7 @@
         <p:spPr>
           <a:xfrm flipH="1" flipV="1">
             <a:off x="3023707" y="3108648"/>
-            <a:ext cx="1953393" cy="781561"/>
+            <a:ext cx="726121" cy="781561"/>
           </a:xfrm>
           <a:prstGeom prst="straightConnector1">
             <a:avLst/>
@@ -4281,9 +3928,9 @@
           <p:nvPr/>
         </p:nvCxnSpPr>
         <p:spPr>
-          <a:xfrm flipH="1" flipV="1">
-            <a:off x="4031706" y="3108648"/>
-            <a:ext cx="945394" cy="781561"/>
+          <a:xfrm flipV="1">
+            <a:off x="3749828" y="3108648"/>
+            <a:ext cx="281878" cy="781561"/>
           </a:xfrm>
           <a:prstGeom prst="straightConnector1">
             <a:avLst/>
@@ -4324,8 +3971,8 @@
         </p:nvCxnSpPr>
         <p:spPr>
           <a:xfrm flipV="1">
-            <a:off x="4977100" y="3108648"/>
-            <a:ext cx="62605" cy="781561"/>
+            <a:off x="3749828" y="3108648"/>
+            <a:ext cx="1289877" cy="781561"/>
           </a:xfrm>
           <a:prstGeom prst="straightConnector1">
             <a:avLst/>
@@ -4363,7 +4010,7 @@
         </p:nvSpPr>
         <p:spPr>
           <a:xfrm>
-            <a:off x="2410878" y="3453715"/>
+            <a:off x="2441649" y="3412944"/>
             <a:ext cx="2332754" cy="276999"/>
           </a:xfrm>
           <a:prstGeom prst="rect">
@@ -4400,6 +4047,1111 @@
     <p:extLst>
       <p:ext uri="{BB962C8B-B14F-4D97-AF65-F5344CB8AC3E}">
         <p14:creationId xmlns:p14="http://schemas.microsoft.com/office/powerpoint/2010/main" val="4085145183"/>
+      </p:ext>
+    </p:extLst>
+  </p:cSld>
+  <p:clrMapOvr>
+    <a:masterClrMapping/>
+  </p:clrMapOvr>
+</p:sld>
+</file>
+
+<file path=ppt/slides/slide2.xml><?xml version="1.0" encoding="utf-8"?>
+<p:sld xmlns:a="http://schemas.openxmlformats.org/drawingml/2006/main" xmlns:r="http://schemas.openxmlformats.org/officeDocument/2006/relationships" xmlns:p="http://schemas.openxmlformats.org/presentationml/2006/main">
+  <p:cSld>
+    <p:spTree>
+      <p:nvGrpSpPr>
+        <p:cNvPr id="1" name=""/>
+        <p:cNvGrpSpPr/>
+        <p:nvPr/>
+      </p:nvGrpSpPr>
+      <p:grpSpPr>
+        <a:xfrm>
+          <a:off x="0" y="0"/>
+          <a:ext cx="0" cy="0"/>
+          <a:chOff x="0" y="0"/>
+          <a:chExt cx="0" cy="0"/>
+        </a:xfrm>
+      </p:grpSpPr>
+      <p:sp>
+        <p:nvSpPr>
+          <p:cNvPr id="4" name="Rectangle 3">
+            <a:extLst>
+              <a:ext uri="{FF2B5EF4-FFF2-40B4-BE49-F238E27FC236}">
+                <a16:creationId xmlns:a16="http://schemas.microsoft.com/office/drawing/2014/main" id="{80499E16-C4FB-403C-9422-275933A393AE}"/>
+              </a:ext>
+            </a:extLst>
+          </p:cNvPr>
+          <p:cNvSpPr/>
+          <p:nvPr/>
+        </p:nvSpPr>
+        <p:spPr>
+          <a:xfrm>
+            <a:off x="2483708" y="2100648"/>
+            <a:ext cx="3107724" cy="1080000"/>
+          </a:xfrm>
+          <a:prstGeom prst="rect">
+            <a:avLst/>
+          </a:prstGeom>
+        </p:spPr>
+        <p:style>
+          <a:lnRef idx="2">
+            <a:schemeClr val="accent5">
+              <a:shade val="50000"/>
+            </a:schemeClr>
+          </a:lnRef>
+          <a:fillRef idx="1">
+            <a:schemeClr val="accent5"/>
+          </a:fillRef>
+          <a:effectRef idx="0">
+            <a:schemeClr val="accent5"/>
+          </a:effectRef>
+          <a:fontRef idx="minor">
+            <a:schemeClr val="lt1"/>
+          </a:fontRef>
+        </p:style>
+        <p:txBody>
+          <a:bodyPr rtlCol="0" anchor="ctr"/>
+          <a:lstStyle/>
+          <a:p>
+            <a:pPr algn="ctr"/>
+            <a:endParaRPr lang="en-US"/>
+          </a:p>
+        </p:txBody>
+      </p:sp>
+      <p:sp>
+        <p:nvSpPr>
+          <p:cNvPr id="5" name="Rectangle 4">
+            <a:extLst>
+              <a:ext uri="{FF2B5EF4-FFF2-40B4-BE49-F238E27FC236}">
+                <a16:creationId xmlns:a16="http://schemas.microsoft.com/office/drawing/2014/main" id="{2ECC0DE1-AC6A-4C77-A108-73BE2BB19D5A}"/>
+              </a:ext>
+            </a:extLst>
+          </p:cNvPr>
+          <p:cNvSpPr/>
+          <p:nvPr/>
+        </p:nvSpPr>
+        <p:spPr>
+          <a:xfrm>
+            <a:off x="2555707" y="2172648"/>
+            <a:ext cx="936000" cy="936000"/>
+          </a:xfrm>
+          <a:prstGeom prst="rect">
+            <a:avLst/>
+          </a:prstGeom>
+        </p:spPr>
+        <p:style>
+          <a:lnRef idx="2">
+            <a:schemeClr val="accent4">
+              <a:shade val="50000"/>
+            </a:schemeClr>
+          </a:lnRef>
+          <a:fillRef idx="1">
+            <a:schemeClr val="accent4"/>
+          </a:fillRef>
+          <a:effectRef idx="0">
+            <a:schemeClr val="accent4"/>
+          </a:effectRef>
+          <a:fontRef idx="minor">
+            <a:schemeClr val="lt1"/>
+          </a:fontRef>
+        </p:style>
+        <p:txBody>
+          <a:bodyPr rtlCol="0" anchor="ctr"/>
+          <a:lstStyle/>
+          <a:p>
+            <a:pPr algn="ctr"/>
+            <a:r>
+              <a:rPr lang="en-US" sz="1200">
+                <a:solidFill>
+                  <a:schemeClr val="accent4">
+                    <a:lumMod val="50000"/>
+                  </a:schemeClr>
+                </a:solidFill>
+              </a:rPr>
+              <a:t>Child</a:t>
+            </a:r>
+          </a:p>
+        </p:txBody>
+      </p:sp>
+      <p:sp>
+        <p:nvSpPr>
+          <p:cNvPr id="6" name="Rectangle 5">
+            <a:extLst>
+              <a:ext uri="{FF2B5EF4-FFF2-40B4-BE49-F238E27FC236}">
+                <a16:creationId xmlns:a16="http://schemas.microsoft.com/office/drawing/2014/main" id="{303B0B85-1044-43BB-B89A-9A520669273B}"/>
+              </a:ext>
+            </a:extLst>
+          </p:cNvPr>
+          <p:cNvSpPr/>
+          <p:nvPr/>
+        </p:nvSpPr>
+        <p:spPr>
+          <a:xfrm>
+            <a:off x="3563706" y="2172648"/>
+            <a:ext cx="936000" cy="936000"/>
+          </a:xfrm>
+          <a:prstGeom prst="rect">
+            <a:avLst/>
+          </a:prstGeom>
+        </p:spPr>
+        <p:style>
+          <a:lnRef idx="2">
+            <a:schemeClr val="accent4">
+              <a:shade val="50000"/>
+            </a:schemeClr>
+          </a:lnRef>
+          <a:fillRef idx="1">
+            <a:schemeClr val="accent4"/>
+          </a:fillRef>
+          <a:effectRef idx="0">
+            <a:schemeClr val="accent4"/>
+          </a:effectRef>
+          <a:fontRef idx="minor">
+            <a:schemeClr val="lt1"/>
+          </a:fontRef>
+        </p:style>
+        <p:txBody>
+          <a:bodyPr rtlCol="0" anchor="ctr"/>
+          <a:lstStyle/>
+          <a:p>
+            <a:pPr algn="ctr"/>
+            <a:r>
+              <a:rPr lang="en-US" sz="1200">
+                <a:solidFill>
+                  <a:schemeClr val="accent4">
+                    <a:lumMod val="50000"/>
+                  </a:schemeClr>
+                </a:solidFill>
+              </a:rPr>
+              <a:t>Child</a:t>
+            </a:r>
+          </a:p>
+        </p:txBody>
+      </p:sp>
+      <p:sp>
+        <p:nvSpPr>
+          <p:cNvPr id="7" name="Rectangle 6">
+            <a:extLst>
+              <a:ext uri="{FF2B5EF4-FFF2-40B4-BE49-F238E27FC236}">
+                <a16:creationId xmlns:a16="http://schemas.microsoft.com/office/drawing/2014/main" id="{C5295F4E-D833-4052-B045-BBCC1316A6AF}"/>
+              </a:ext>
+            </a:extLst>
+          </p:cNvPr>
+          <p:cNvSpPr/>
+          <p:nvPr/>
+        </p:nvSpPr>
+        <p:spPr>
+          <a:xfrm>
+            <a:off x="4571705" y="2172648"/>
+            <a:ext cx="936000" cy="936000"/>
+          </a:xfrm>
+          <a:prstGeom prst="rect">
+            <a:avLst/>
+          </a:prstGeom>
+        </p:spPr>
+        <p:style>
+          <a:lnRef idx="2">
+            <a:schemeClr val="accent4">
+              <a:shade val="50000"/>
+            </a:schemeClr>
+          </a:lnRef>
+          <a:fillRef idx="1">
+            <a:schemeClr val="accent4"/>
+          </a:fillRef>
+          <a:effectRef idx="0">
+            <a:schemeClr val="accent4"/>
+          </a:effectRef>
+          <a:fontRef idx="minor">
+            <a:schemeClr val="lt1"/>
+          </a:fontRef>
+        </p:style>
+        <p:txBody>
+          <a:bodyPr rtlCol="0" anchor="ctr"/>
+          <a:lstStyle/>
+          <a:p>
+            <a:pPr algn="ctr"/>
+            <a:r>
+              <a:rPr lang="en-US" sz="1200">
+                <a:solidFill>
+                  <a:schemeClr val="accent4">
+                    <a:lumMod val="50000"/>
+                  </a:schemeClr>
+                </a:solidFill>
+              </a:rPr>
+              <a:t>Child</a:t>
+            </a:r>
+          </a:p>
+        </p:txBody>
+      </p:sp>
+      <p:cxnSp>
+        <p:nvCxnSpPr>
+          <p:cNvPr id="9" name="Straight Arrow Connector 8">
+            <a:extLst>
+              <a:ext uri="{FF2B5EF4-FFF2-40B4-BE49-F238E27FC236}">
+                <a16:creationId xmlns:a16="http://schemas.microsoft.com/office/drawing/2014/main" id="{275DA3DC-706F-4571-9075-6AF46913CBD2}"/>
+              </a:ext>
+            </a:extLst>
+          </p:cNvPr>
+          <p:cNvCxnSpPr/>
+          <p:nvPr/>
+        </p:nvCxnSpPr>
+        <p:spPr>
+          <a:xfrm>
+            <a:off x="2483708" y="3429000"/>
+            <a:ext cx="3107724" cy="0"/>
+          </a:xfrm>
+          <a:prstGeom prst="straightConnector1">
+            <a:avLst/>
+          </a:prstGeom>
+          <a:ln>
+            <a:tailEnd type="triangle"/>
+          </a:ln>
+        </p:spPr>
+        <p:style>
+          <a:lnRef idx="1">
+            <a:schemeClr val="accent1"/>
+          </a:lnRef>
+          <a:fillRef idx="0">
+            <a:schemeClr val="accent1"/>
+          </a:fillRef>
+          <a:effectRef idx="0">
+            <a:schemeClr val="accent1"/>
+          </a:effectRef>
+          <a:fontRef idx="minor">
+            <a:schemeClr val="tx1"/>
+          </a:fontRef>
+        </p:style>
+      </p:cxnSp>
+      <p:sp>
+        <p:nvSpPr>
+          <p:cNvPr id="12" name="Right Brace 11">
+            <a:extLst>
+              <a:ext uri="{FF2B5EF4-FFF2-40B4-BE49-F238E27FC236}">
+                <a16:creationId xmlns:a16="http://schemas.microsoft.com/office/drawing/2014/main" id="{6B613B30-3D82-4D46-BC0F-27236DEBB188}"/>
+              </a:ext>
+            </a:extLst>
+          </p:cNvPr>
+          <p:cNvSpPr/>
+          <p:nvPr/>
+        </p:nvSpPr>
+        <p:spPr>
+          <a:xfrm rot="16200000">
+            <a:off x="3899070" y="-78785"/>
+            <a:ext cx="276999" cy="3107723"/>
+          </a:xfrm>
+          <a:prstGeom prst="rightBrace">
+            <a:avLst>
+              <a:gd name="adj1" fmla="val 54412"/>
+              <a:gd name="adj2" fmla="val 50000"/>
+            </a:avLst>
+          </a:prstGeom>
+        </p:spPr>
+        <p:style>
+          <a:lnRef idx="1">
+            <a:schemeClr val="accent1"/>
+          </a:lnRef>
+          <a:fillRef idx="0">
+            <a:schemeClr val="accent1"/>
+          </a:fillRef>
+          <a:effectRef idx="0">
+            <a:schemeClr val="accent1"/>
+          </a:effectRef>
+          <a:fontRef idx="minor">
+            <a:schemeClr val="tx1"/>
+          </a:fontRef>
+        </p:style>
+        <p:txBody>
+          <a:bodyPr rtlCol="0" anchor="ctr"/>
+          <a:lstStyle/>
+          <a:p>
+            <a:pPr algn="ctr"/>
+            <a:endParaRPr lang="en-US"/>
+          </a:p>
+        </p:txBody>
+      </p:sp>
+      <p:sp>
+        <p:nvSpPr>
+          <p:cNvPr id="13" name="TextBox 12">
+            <a:extLst>
+              <a:ext uri="{FF2B5EF4-FFF2-40B4-BE49-F238E27FC236}">
+                <a16:creationId xmlns:a16="http://schemas.microsoft.com/office/drawing/2014/main" id="{1BC8E3DD-72EC-4E50-B2D0-D10417C939B9}"/>
+              </a:ext>
+            </a:extLst>
+          </p:cNvPr>
+          <p:cNvSpPr txBox="1"/>
+          <p:nvPr/>
+        </p:nvSpPr>
+        <p:spPr>
+          <a:xfrm>
+            <a:off x="3371541" y="1016318"/>
+            <a:ext cx="1270541" cy="276999"/>
+          </a:xfrm>
+          <a:prstGeom prst="rect">
+            <a:avLst/>
+          </a:prstGeom>
+          <a:noFill/>
+        </p:spPr>
+        <p:txBody>
+          <a:bodyPr wrap="none" rtlCol="0">
+            <a:spAutoFit/>
+          </a:bodyPr>
+          <a:lstStyle>
+            <a:defPPr>
+              <a:defRPr lang="en-US"/>
+            </a:defPPr>
+            <a:lvl1pPr algn="ctr">
+              <a:defRPr sz="1200">
+                <a:solidFill>
+                  <a:schemeClr val="accent5"/>
+                </a:solidFill>
+              </a:defRPr>
+            </a:lvl1pPr>
+          </a:lstStyle>
+          <a:p>
+            <a:r>
+              <a:rPr lang="en-US" err="1"/>
+              <a:t>ArrayPanel.Width</a:t>
+            </a:r>
+            <a:endParaRPr lang="en-US"/>
+          </a:p>
+        </p:txBody>
+      </p:sp>
+      <p:sp>
+        <p:nvSpPr>
+          <p:cNvPr id="15" name="TextBox 14">
+            <a:extLst>
+              <a:ext uri="{FF2B5EF4-FFF2-40B4-BE49-F238E27FC236}">
+                <a16:creationId xmlns:a16="http://schemas.microsoft.com/office/drawing/2014/main" id="{BEFF14B3-30FF-4DA2-8607-ECA46A102845}"/>
+              </a:ext>
+            </a:extLst>
+          </p:cNvPr>
+          <p:cNvSpPr txBox="1"/>
+          <p:nvPr/>
+        </p:nvSpPr>
+        <p:spPr>
+          <a:xfrm>
+            <a:off x="4906683" y="1697505"/>
+            <a:ext cx="1375954" cy="276999"/>
+          </a:xfrm>
+          <a:prstGeom prst="rect">
+            <a:avLst/>
+          </a:prstGeom>
+          <a:noFill/>
+        </p:spPr>
+        <p:txBody>
+          <a:bodyPr wrap="none" rtlCol="0">
+            <a:spAutoFit/>
+          </a:bodyPr>
+          <a:lstStyle>
+            <a:defPPr>
+              <a:defRPr lang="en-US"/>
+            </a:defPPr>
+            <a:lvl1pPr algn="ctr">
+              <a:defRPr sz="1200">
+                <a:solidFill>
+                  <a:schemeClr val="accent5"/>
+                </a:solidFill>
+              </a:defRPr>
+            </a:lvl1pPr>
+          </a:lstStyle>
+          <a:p>
+            <a:r>
+              <a:rPr lang="en-US" err="1">
+                <a:solidFill>
+                  <a:schemeClr val="accent2"/>
+                </a:solidFill>
+              </a:rPr>
+              <a:t>ArrayPanel.Spacing</a:t>
+            </a:r>
+            <a:endParaRPr lang="en-US">
+              <a:solidFill>
+                <a:schemeClr val="accent2"/>
+              </a:solidFill>
+            </a:endParaRPr>
+          </a:p>
+        </p:txBody>
+      </p:sp>
+      <p:cxnSp>
+        <p:nvCxnSpPr>
+          <p:cNvPr id="17" name="Straight Arrow Connector 16">
+            <a:extLst>
+              <a:ext uri="{FF2B5EF4-FFF2-40B4-BE49-F238E27FC236}">
+                <a16:creationId xmlns:a16="http://schemas.microsoft.com/office/drawing/2014/main" id="{479D9E8F-E9B5-4E4C-84E0-34210A5C9ABB}"/>
+              </a:ext>
+            </a:extLst>
+          </p:cNvPr>
+          <p:cNvCxnSpPr>
+            <a:cxnSpLocks/>
+            <a:stCxn id="15" idx="2"/>
+            <a:endCxn id="7" idx="1"/>
+          </p:cNvCxnSpPr>
+          <p:nvPr/>
+        </p:nvCxnSpPr>
+        <p:spPr>
+          <a:xfrm flipH="1">
+            <a:off x="4571705" y="1974504"/>
+            <a:ext cx="1022955" cy="666144"/>
+          </a:xfrm>
+          <a:prstGeom prst="straightConnector1">
+            <a:avLst/>
+          </a:prstGeom>
+          <a:ln w="12700">
+            <a:tailEnd type="triangle"/>
+          </a:ln>
+        </p:spPr>
+        <p:style>
+          <a:lnRef idx="1">
+            <a:schemeClr val="accent2"/>
+          </a:lnRef>
+          <a:fillRef idx="0">
+            <a:schemeClr val="accent2"/>
+          </a:fillRef>
+          <a:effectRef idx="0">
+            <a:schemeClr val="accent2"/>
+          </a:effectRef>
+          <a:fontRef idx="minor">
+            <a:schemeClr val="tx1"/>
+          </a:fontRef>
+        </p:style>
+      </p:cxnSp>
+      <p:cxnSp>
+        <p:nvCxnSpPr>
+          <p:cNvPr id="19" name="Straight Arrow Connector 18">
+            <a:extLst>
+              <a:ext uri="{FF2B5EF4-FFF2-40B4-BE49-F238E27FC236}">
+                <a16:creationId xmlns:a16="http://schemas.microsoft.com/office/drawing/2014/main" id="{50EF521C-D6CF-452B-8B0A-25B2AC9292A2}"/>
+              </a:ext>
+            </a:extLst>
+          </p:cNvPr>
+          <p:cNvCxnSpPr>
+            <a:cxnSpLocks/>
+            <a:stCxn id="15" idx="2"/>
+            <a:endCxn id="6" idx="1"/>
+          </p:cNvCxnSpPr>
+          <p:nvPr/>
+        </p:nvCxnSpPr>
+        <p:spPr>
+          <a:xfrm flipH="1">
+            <a:off x="3563706" y="1974504"/>
+            <a:ext cx="2030954" cy="666144"/>
+          </a:xfrm>
+          <a:prstGeom prst="straightConnector1">
+            <a:avLst/>
+          </a:prstGeom>
+          <a:ln w="12700">
+            <a:tailEnd type="triangle"/>
+          </a:ln>
+        </p:spPr>
+        <p:style>
+          <a:lnRef idx="1">
+            <a:schemeClr val="accent2"/>
+          </a:lnRef>
+          <a:fillRef idx="0">
+            <a:schemeClr val="accent2"/>
+          </a:fillRef>
+          <a:effectRef idx="0">
+            <a:schemeClr val="accent2"/>
+          </a:effectRef>
+          <a:fontRef idx="minor">
+            <a:schemeClr val="tx1"/>
+          </a:fontRef>
+        </p:style>
+      </p:cxnSp>
+      <p:sp>
+        <p:nvSpPr>
+          <p:cNvPr id="21" name="TextBox 20">
+            <a:extLst>
+              <a:ext uri="{FF2B5EF4-FFF2-40B4-BE49-F238E27FC236}">
+                <a16:creationId xmlns:a16="http://schemas.microsoft.com/office/drawing/2014/main" id="{1F96AD62-920F-4A51-9552-06EC75700E9F}"/>
+              </a:ext>
+            </a:extLst>
+          </p:cNvPr>
+          <p:cNvSpPr txBox="1"/>
+          <p:nvPr/>
+        </p:nvSpPr>
+        <p:spPr>
+          <a:xfrm>
+            <a:off x="567374" y="1697505"/>
+            <a:ext cx="1396665" cy="276999"/>
+          </a:xfrm>
+          <a:prstGeom prst="rect">
+            <a:avLst/>
+          </a:prstGeom>
+          <a:noFill/>
+        </p:spPr>
+        <p:txBody>
+          <a:bodyPr wrap="none" rtlCol="0">
+            <a:spAutoFit/>
+          </a:bodyPr>
+          <a:lstStyle>
+            <a:defPPr>
+              <a:defRPr lang="en-US"/>
+            </a:defPPr>
+            <a:lvl1pPr algn="ctr">
+              <a:defRPr sz="1200">
+                <a:solidFill>
+                  <a:schemeClr val="accent5"/>
+                </a:solidFill>
+              </a:defRPr>
+            </a:lvl1pPr>
+          </a:lstStyle>
+          <a:p>
+            <a:r>
+              <a:rPr lang="en-US" err="1">
+                <a:solidFill>
+                  <a:schemeClr val="accent6"/>
+                </a:solidFill>
+              </a:rPr>
+              <a:t>ArrayPanel.Padding</a:t>
+            </a:r>
+            <a:endParaRPr lang="en-US">
+              <a:solidFill>
+                <a:schemeClr val="accent6"/>
+              </a:solidFill>
+            </a:endParaRPr>
+          </a:p>
+        </p:txBody>
+      </p:sp>
+      <p:cxnSp>
+        <p:nvCxnSpPr>
+          <p:cNvPr id="22" name="Straight Arrow Connector 21">
+            <a:extLst>
+              <a:ext uri="{FF2B5EF4-FFF2-40B4-BE49-F238E27FC236}">
+                <a16:creationId xmlns:a16="http://schemas.microsoft.com/office/drawing/2014/main" id="{F3AB5668-4181-4522-8F5B-0D33131F801C}"/>
+              </a:ext>
+            </a:extLst>
+          </p:cNvPr>
+          <p:cNvCxnSpPr>
+            <a:cxnSpLocks/>
+            <a:stCxn id="21" idx="3"/>
+            <a:endCxn id="31" idx="1"/>
+          </p:cNvCxnSpPr>
+          <p:nvPr/>
+        </p:nvCxnSpPr>
+        <p:spPr>
+          <a:xfrm>
+            <a:off x="1964039" y="1836005"/>
+            <a:ext cx="519595" cy="804642"/>
+          </a:xfrm>
+          <a:prstGeom prst="straightConnector1">
+            <a:avLst/>
+          </a:prstGeom>
+          <a:ln w="12700">
+            <a:solidFill>
+              <a:schemeClr val="accent6">
+                <a:lumMod val="40000"/>
+                <a:lumOff val="60000"/>
+              </a:schemeClr>
+            </a:solidFill>
+            <a:tailEnd type="triangle"/>
+          </a:ln>
+        </p:spPr>
+        <p:style>
+          <a:lnRef idx="1">
+            <a:schemeClr val="accent6"/>
+          </a:lnRef>
+          <a:fillRef idx="0">
+            <a:schemeClr val="accent6"/>
+          </a:fillRef>
+          <a:effectRef idx="0">
+            <a:schemeClr val="accent6"/>
+          </a:effectRef>
+          <a:fontRef idx="minor">
+            <a:schemeClr val="tx1"/>
+          </a:fontRef>
+        </p:style>
+      </p:cxnSp>
+      <p:sp>
+        <p:nvSpPr>
+          <p:cNvPr id="25" name="Rectangle 24">
+            <a:extLst>
+              <a:ext uri="{FF2B5EF4-FFF2-40B4-BE49-F238E27FC236}">
+                <a16:creationId xmlns:a16="http://schemas.microsoft.com/office/drawing/2014/main" id="{7DB920FC-D6B6-4099-9726-927B422B6A64}"/>
+              </a:ext>
+            </a:extLst>
+          </p:cNvPr>
+          <p:cNvSpPr/>
+          <p:nvPr/>
+        </p:nvSpPr>
+        <p:spPr>
+          <a:xfrm>
+            <a:off x="4499706" y="2460648"/>
+            <a:ext cx="71999" cy="360000"/>
+          </a:xfrm>
+          <a:prstGeom prst="rect">
+            <a:avLst/>
+          </a:prstGeom>
+          <a:ln>
+            <a:noFill/>
+          </a:ln>
+        </p:spPr>
+        <p:style>
+          <a:lnRef idx="2">
+            <a:schemeClr val="accent2">
+              <a:shade val="50000"/>
+            </a:schemeClr>
+          </a:lnRef>
+          <a:fillRef idx="1">
+            <a:schemeClr val="accent2"/>
+          </a:fillRef>
+          <a:effectRef idx="0">
+            <a:schemeClr val="accent2"/>
+          </a:effectRef>
+          <a:fontRef idx="minor">
+            <a:schemeClr val="lt1"/>
+          </a:fontRef>
+        </p:style>
+        <p:txBody>
+          <a:bodyPr rtlCol="0" anchor="ctr"/>
+          <a:lstStyle/>
+          <a:p>
+            <a:pPr algn="ctr"/>
+            <a:endParaRPr lang="en-US"/>
+          </a:p>
+        </p:txBody>
+      </p:sp>
+      <p:sp>
+        <p:nvSpPr>
+          <p:cNvPr id="26" name="Rectangle 25">
+            <a:extLst>
+              <a:ext uri="{FF2B5EF4-FFF2-40B4-BE49-F238E27FC236}">
+                <a16:creationId xmlns:a16="http://schemas.microsoft.com/office/drawing/2014/main" id="{4511561F-3BE7-4CCD-859D-3D5A62BB31BF}"/>
+              </a:ext>
+            </a:extLst>
+          </p:cNvPr>
+          <p:cNvSpPr/>
+          <p:nvPr/>
+        </p:nvSpPr>
+        <p:spPr>
+          <a:xfrm>
+            <a:off x="3491559" y="2460647"/>
+            <a:ext cx="71999" cy="360000"/>
+          </a:xfrm>
+          <a:prstGeom prst="rect">
+            <a:avLst/>
+          </a:prstGeom>
+          <a:ln>
+            <a:noFill/>
+          </a:ln>
+        </p:spPr>
+        <p:style>
+          <a:lnRef idx="2">
+            <a:schemeClr val="accent2">
+              <a:shade val="50000"/>
+            </a:schemeClr>
+          </a:lnRef>
+          <a:fillRef idx="1">
+            <a:schemeClr val="accent2"/>
+          </a:fillRef>
+          <a:effectRef idx="0">
+            <a:schemeClr val="accent2"/>
+          </a:effectRef>
+          <a:fontRef idx="minor">
+            <a:schemeClr val="lt1"/>
+          </a:fontRef>
+        </p:style>
+        <p:txBody>
+          <a:bodyPr rtlCol="0" anchor="ctr"/>
+          <a:lstStyle/>
+          <a:p>
+            <a:pPr algn="ctr"/>
+            <a:endParaRPr lang="en-US"/>
+          </a:p>
+        </p:txBody>
+      </p:sp>
+      <p:sp>
+        <p:nvSpPr>
+          <p:cNvPr id="31" name="Rectangle 30">
+            <a:extLst>
+              <a:ext uri="{FF2B5EF4-FFF2-40B4-BE49-F238E27FC236}">
+                <a16:creationId xmlns:a16="http://schemas.microsoft.com/office/drawing/2014/main" id="{6E4D8CFC-854E-4C23-9072-893D471E52E9}"/>
+              </a:ext>
+            </a:extLst>
+          </p:cNvPr>
+          <p:cNvSpPr/>
+          <p:nvPr/>
+        </p:nvSpPr>
+        <p:spPr>
+          <a:xfrm>
+            <a:off x="2483634" y="2460647"/>
+            <a:ext cx="71999" cy="360000"/>
+          </a:xfrm>
+          <a:prstGeom prst="rect">
+            <a:avLst/>
+          </a:prstGeom>
+          <a:solidFill>
+            <a:schemeClr val="accent6">
+              <a:lumMod val="60000"/>
+              <a:lumOff val="40000"/>
+            </a:schemeClr>
+          </a:solidFill>
+          <a:ln>
+            <a:noFill/>
+          </a:ln>
+        </p:spPr>
+        <p:style>
+          <a:lnRef idx="2">
+            <a:schemeClr val="accent2">
+              <a:shade val="50000"/>
+            </a:schemeClr>
+          </a:lnRef>
+          <a:fillRef idx="1">
+            <a:schemeClr val="accent2"/>
+          </a:fillRef>
+          <a:effectRef idx="0">
+            <a:schemeClr val="accent2"/>
+          </a:effectRef>
+          <a:fontRef idx="minor">
+            <a:schemeClr val="lt1"/>
+          </a:fontRef>
+        </p:style>
+        <p:txBody>
+          <a:bodyPr rtlCol="0" anchor="ctr"/>
+          <a:lstStyle/>
+          <a:p>
+            <a:pPr algn="ctr"/>
+            <a:endParaRPr lang="en-US"/>
+          </a:p>
+        </p:txBody>
+      </p:sp>
+      <p:sp>
+        <p:nvSpPr>
+          <p:cNvPr id="32" name="Rectangle 31">
+            <a:extLst>
+              <a:ext uri="{FF2B5EF4-FFF2-40B4-BE49-F238E27FC236}">
+                <a16:creationId xmlns:a16="http://schemas.microsoft.com/office/drawing/2014/main" id="{C0269DF1-7E8D-488A-9CC4-CD795460AB92}"/>
+              </a:ext>
+            </a:extLst>
+          </p:cNvPr>
+          <p:cNvSpPr/>
+          <p:nvPr/>
+        </p:nvSpPr>
+        <p:spPr>
+          <a:xfrm rot="5400000">
+            <a:off x="2987707" y="1956649"/>
+            <a:ext cx="71999" cy="360000"/>
+          </a:xfrm>
+          <a:prstGeom prst="rect">
+            <a:avLst/>
+          </a:prstGeom>
+          <a:solidFill>
+            <a:schemeClr val="accent6">
+              <a:lumMod val="60000"/>
+              <a:lumOff val="40000"/>
+            </a:schemeClr>
+          </a:solidFill>
+          <a:ln>
+            <a:noFill/>
+          </a:ln>
+        </p:spPr>
+        <p:style>
+          <a:lnRef idx="2">
+            <a:schemeClr val="accent2">
+              <a:shade val="50000"/>
+            </a:schemeClr>
+          </a:lnRef>
+          <a:fillRef idx="1">
+            <a:schemeClr val="accent2"/>
+          </a:fillRef>
+          <a:effectRef idx="0">
+            <a:schemeClr val="accent2"/>
+          </a:effectRef>
+          <a:fontRef idx="minor">
+            <a:schemeClr val="lt1"/>
+          </a:fontRef>
+        </p:style>
+        <p:txBody>
+          <a:bodyPr rtlCol="0" anchor="ctr"/>
+          <a:lstStyle/>
+          <a:p>
+            <a:pPr algn="ctr"/>
+            <a:endParaRPr lang="en-US"/>
+          </a:p>
+        </p:txBody>
+      </p:sp>
+      <p:cxnSp>
+        <p:nvCxnSpPr>
+          <p:cNvPr id="35" name="Straight Arrow Connector 34">
+            <a:extLst>
+              <a:ext uri="{FF2B5EF4-FFF2-40B4-BE49-F238E27FC236}">
+                <a16:creationId xmlns:a16="http://schemas.microsoft.com/office/drawing/2014/main" id="{2A114B21-C997-4D5B-952A-242B5B03AA82}"/>
+              </a:ext>
+            </a:extLst>
+          </p:cNvPr>
+          <p:cNvCxnSpPr>
+            <a:cxnSpLocks/>
+            <a:stCxn id="21" idx="3"/>
+            <a:endCxn id="32" idx="2"/>
+          </p:cNvCxnSpPr>
+          <p:nvPr/>
+        </p:nvCxnSpPr>
+        <p:spPr>
+          <a:xfrm>
+            <a:off x="1964039" y="1836005"/>
+            <a:ext cx="879668" cy="300645"/>
+          </a:xfrm>
+          <a:prstGeom prst="straightConnector1">
+            <a:avLst/>
+          </a:prstGeom>
+          <a:ln w="12700">
+            <a:solidFill>
+              <a:schemeClr val="accent6">
+                <a:lumMod val="40000"/>
+                <a:lumOff val="60000"/>
+              </a:schemeClr>
+            </a:solidFill>
+            <a:tailEnd type="triangle"/>
+          </a:ln>
+        </p:spPr>
+        <p:style>
+          <a:lnRef idx="1">
+            <a:schemeClr val="accent6"/>
+          </a:lnRef>
+          <a:fillRef idx="0">
+            <a:schemeClr val="accent6"/>
+          </a:fillRef>
+          <a:effectRef idx="0">
+            <a:schemeClr val="accent6"/>
+          </a:effectRef>
+          <a:fontRef idx="minor">
+            <a:schemeClr val="tx1"/>
+          </a:fontRef>
+        </p:style>
+      </p:cxnSp>
+      <p:sp>
+        <p:nvSpPr>
+          <p:cNvPr id="38" name="TextBox 37">
+            <a:extLst>
+              <a:ext uri="{FF2B5EF4-FFF2-40B4-BE49-F238E27FC236}">
+                <a16:creationId xmlns:a16="http://schemas.microsoft.com/office/drawing/2014/main" id="{830B4EBC-AA88-46F7-856C-70262F9A25C1}"/>
+              </a:ext>
+            </a:extLst>
+          </p:cNvPr>
+          <p:cNvSpPr txBox="1"/>
+          <p:nvPr/>
+        </p:nvSpPr>
+        <p:spPr>
+          <a:xfrm>
+            <a:off x="3952524" y="3890209"/>
+            <a:ext cx="2049151" cy="461665"/>
+          </a:xfrm>
+          <a:prstGeom prst="rect">
+            <a:avLst/>
+          </a:prstGeom>
+          <a:noFill/>
+        </p:spPr>
+        <p:txBody>
+          <a:bodyPr wrap="none" rtlCol="0">
+            <a:spAutoFit/>
+          </a:bodyPr>
+          <a:lstStyle/>
+          <a:p>
+            <a:pPr algn="ctr"/>
+            <a:r>
+              <a:rPr lang="en-US" sz="1200">
+                <a:solidFill>
+                  <a:schemeClr val="accent4">
+                    <a:lumMod val="75000"/>
+                  </a:schemeClr>
+                </a:solidFill>
+              </a:rPr>
+              <a:t>Available width distributed</a:t>
+            </a:r>
+          </a:p>
+          <a:p>
+            <a:pPr algn="ctr"/>
+            <a:r>
+              <a:rPr lang="en-US" sz="1200">
+                <a:solidFill>
+                  <a:schemeClr val="accent4">
+                    <a:lumMod val="75000"/>
+                  </a:schemeClr>
+                </a:solidFill>
+              </a:rPr>
+              <a:t>equally among child elements</a:t>
+            </a:r>
+          </a:p>
+        </p:txBody>
+      </p:sp>
+      <p:cxnSp>
+        <p:nvCxnSpPr>
+          <p:cNvPr id="40" name="Straight Arrow Connector 39">
+            <a:extLst>
+              <a:ext uri="{FF2B5EF4-FFF2-40B4-BE49-F238E27FC236}">
+                <a16:creationId xmlns:a16="http://schemas.microsoft.com/office/drawing/2014/main" id="{B738D778-47C8-4FCC-9C58-BAF6FD8883A1}"/>
+              </a:ext>
+            </a:extLst>
+          </p:cNvPr>
+          <p:cNvCxnSpPr>
+            <a:stCxn id="38" idx="0"/>
+            <a:endCxn id="5" idx="2"/>
+          </p:cNvCxnSpPr>
+          <p:nvPr/>
+        </p:nvCxnSpPr>
+        <p:spPr>
+          <a:xfrm flipH="1" flipV="1">
+            <a:off x="3023707" y="3108648"/>
+            <a:ext cx="1953393" cy="781561"/>
+          </a:xfrm>
+          <a:prstGeom prst="straightConnector1">
+            <a:avLst/>
+          </a:prstGeom>
+          <a:ln w="12700">
+            <a:tailEnd type="triangle"/>
+          </a:ln>
+        </p:spPr>
+        <p:style>
+          <a:lnRef idx="1">
+            <a:schemeClr val="accent4"/>
+          </a:lnRef>
+          <a:fillRef idx="0">
+            <a:schemeClr val="accent4"/>
+          </a:fillRef>
+          <a:effectRef idx="0">
+            <a:schemeClr val="accent4"/>
+          </a:effectRef>
+          <a:fontRef idx="minor">
+            <a:schemeClr val="tx1"/>
+          </a:fontRef>
+        </p:style>
+      </p:cxnSp>
+      <p:cxnSp>
+        <p:nvCxnSpPr>
+          <p:cNvPr id="42" name="Straight Arrow Connector 41">
+            <a:extLst>
+              <a:ext uri="{FF2B5EF4-FFF2-40B4-BE49-F238E27FC236}">
+                <a16:creationId xmlns:a16="http://schemas.microsoft.com/office/drawing/2014/main" id="{8D829D29-4153-4817-9D1C-788F23546A71}"/>
+              </a:ext>
+            </a:extLst>
+          </p:cNvPr>
+          <p:cNvCxnSpPr>
+            <a:cxnSpLocks/>
+            <a:stCxn id="38" idx="0"/>
+            <a:endCxn id="6" idx="2"/>
+          </p:cNvCxnSpPr>
+          <p:nvPr/>
+        </p:nvCxnSpPr>
+        <p:spPr>
+          <a:xfrm flipH="1" flipV="1">
+            <a:off x="4031706" y="3108648"/>
+            <a:ext cx="945394" cy="781561"/>
+          </a:xfrm>
+          <a:prstGeom prst="straightConnector1">
+            <a:avLst/>
+          </a:prstGeom>
+          <a:ln w="12700">
+            <a:tailEnd type="triangle"/>
+          </a:ln>
+        </p:spPr>
+        <p:style>
+          <a:lnRef idx="1">
+            <a:schemeClr val="accent4"/>
+          </a:lnRef>
+          <a:fillRef idx="0">
+            <a:schemeClr val="accent4"/>
+          </a:fillRef>
+          <a:effectRef idx="0">
+            <a:schemeClr val="accent4"/>
+          </a:effectRef>
+          <a:fontRef idx="minor">
+            <a:schemeClr val="tx1"/>
+          </a:fontRef>
+        </p:style>
+      </p:cxnSp>
+      <p:cxnSp>
+        <p:nvCxnSpPr>
+          <p:cNvPr id="44" name="Straight Arrow Connector 43">
+            <a:extLst>
+              <a:ext uri="{FF2B5EF4-FFF2-40B4-BE49-F238E27FC236}">
+                <a16:creationId xmlns:a16="http://schemas.microsoft.com/office/drawing/2014/main" id="{297DC946-D1F2-41A7-AD96-C125C0786745}"/>
+              </a:ext>
+            </a:extLst>
+          </p:cNvPr>
+          <p:cNvCxnSpPr>
+            <a:stCxn id="38" idx="0"/>
+            <a:endCxn id="7" idx="2"/>
+          </p:cNvCxnSpPr>
+          <p:nvPr/>
+        </p:nvCxnSpPr>
+        <p:spPr>
+          <a:xfrm flipV="1">
+            <a:off x="4977100" y="3108648"/>
+            <a:ext cx="62605" cy="781561"/>
+          </a:xfrm>
+          <a:prstGeom prst="straightConnector1">
+            <a:avLst/>
+          </a:prstGeom>
+          <a:ln w="12700">
+            <a:tailEnd type="triangle"/>
+          </a:ln>
+        </p:spPr>
+        <p:style>
+          <a:lnRef idx="1">
+            <a:schemeClr val="accent4"/>
+          </a:lnRef>
+          <a:fillRef idx="0">
+            <a:schemeClr val="accent4"/>
+          </a:fillRef>
+          <a:effectRef idx="0">
+            <a:schemeClr val="accent4"/>
+          </a:effectRef>
+          <a:fontRef idx="minor">
+            <a:schemeClr val="tx1"/>
+          </a:fontRef>
+        </p:style>
+      </p:cxnSp>
+      <p:sp>
+        <p:nvSpPr>
+          <p:cNvPr id="10" name="TextBox 9">
+            <a:extLst>
+              <a:ext uri="{FF2B5EF4-FFF2-40B4-BE49-F238E27FC236}">
+                <a16:creationId xmlns:a16="http://schemas.microsoft.com/office/drawing/2014/main" id="{EAD70FDD-305A-43F0-AC24-31662A99943B}"/>
+              </a:ext>
+            </a:extLst>
+          </p:cNvPr>
+          <p:cNvSpPr txBox="1"/>
+          <p:nvPr/>
+        </p:nvSpPr>
+        <p:spPr>
+          <a:xfrm>
+            <a:off x="2410878" y="3453715"/>
+            <a:ext cx="2332754" cy="276999"/>
+          </a:xfrm>
+          <a:prstGeom prst="rect">
+            <a:avLst/>
+          </a:prstGeom>
+          <a:noFill/>
+        </p:spPr>
+        <p:txBody>
+          <a:bodyPr wrap="none" rtlCol="0">
+            <a:spAutoFit/>
+          </a:bodyPr>
+          <a:lstStyle>
+            <a:defPPr>
+              <a:defRPr lang="en-US"/>
+            </a:defPPr>
+            <a:lvl1pPr algn="ctr">
+              <a:defRPr sz="1200">
+                <a:solidFill>
+                  <a:schemeClr val="accent5"/>
+                </a:solidFill>
+              </a:defRPr>
+            </a:lvl1pPr>
+          </a:lstStyle>
+          <a:p>
+            <a:pPr algn="l"/>
+            <a:r>
+              <a:rPr lang="en-US"/>
+              <a:t>ArrayPanel.Orientation: Horizontal</a:t>
+            </a:r>
+          </a:p>
+        </p:txBody>
+      </p:sp>
+    </p:spTree>
+    <p:extLst>
+      <p:ext uri="{BB962C8B-B14F-4D97-AF65-F5344CB8AC3E}">
+        <p14:creationId xmlns:p14="http://schemas.microsoft.com/office/powerpoint/2010/main" val="26697542"/>
       </p:ext>
     </p:extLst>
   </p:cSld>

</xml_diff>